<commit_message>
fix typo in poster
</commit_message>
<xml_diff>
--- a/Documents/EmotionalRecognitionPoster.pptx
+++ b/Documents/EmotionalRecognitionPoster.pptx
@@ -4789,17 +4789,17 @@
                 <a:latin typeface="Tahoma" pitchFamily="34" charset="0"/>
                 <a:cs typeface="Tahoma" pitchFamily="34" charset="0"/>
               </a:rPr>
-              <a:t>borders and 68 landmarks (with trained NN from DLIB </a:t>
-            </a:r>
-            <a:r>
-              <a:rPr lang="en-US" sz="2000" dirty="0" err="1">
+              <a:t>borders and 68 landmarks (with trained NN from </a:t>
+            </a:r>
+            <a:r>
+              <a:rPr lang="en-US" sz="2000">
                 <a:solidFill>
                   <a:srgbClr val="006699"/>
                 </a:solidFill>
                 <a:latin typeface="Tahoma" pitchFamily="34" charset="0"/>
                 <a:cs typeface="Tahoma" pitchFamily="34" charset="0"/>
               </a:rPr>
-              <a:t>libarary</a:t>
+              <a:t>DLIB library</a:t>
             </a:r>
             <a:r>
               <a:rPr lang="en-US" sz="2000" dirty="0">

</xml_diff>